<commit_message>
update pptx & add some paper
</commit_message>
<xml_diff>
--- a/赵玉琦硕士论文答辩.pptx
+++ b/赵玉琦硕士论文答辩.pptx
@@ -8846,14 +8846,7 @@
                 <a:latin typeface="黑体" panose="02010609060101010101" pitchFamily="49" charset="-122"/>
                 <a:ea typeface="黑体" panose="02010609060101010101" pitchFamily="49" charset="-122"/>
               </a:rPr>
-              <a:t>： </a:t>
-            </a:r>
-            <a:r>
-              <a:rPr lang="zh-CN" altLang="en-US" smtClean="0">
-                <a:latin typeface="黑体" panose="02010609060101010101" pitchFamily="49" charset="-122"/>
-                <a:ea typeface="黑体" panose="02010609060101010101" pitchFamily="49" charset="-122"/>
-              </a:rPr>
-              <a:t>李兵教授</a:t>
+              <a:t>： 李兵教授</a:t>
             </a:r>
             <a:endParaRPr lang="en-US" altLang="zh-CN" dirty="0" smtClean="0">
               <a:latin typeface="黑体" panose="02010609060101010101" pitchFamily="49" charset="-122"/>
@@ -11758,7 +11751,7 @@
           <a:graphicData uri="http://schemas.openxmlformats.org/presentationml/2006/ole">
             <mc:AlternateContent xmlns:mc="http://schemas.openxmlformats.org/markup-compatibility/2006">
               <mc:Choice xmlns:v="urn:schemas-microsoft-com:vml" Requires="v">
-                <p:oleObj spid="_x0000_s71690" name="Visio" r:id="rId4" imgW="3817620" imgH="5402967" progId="Visio.Drawing.11">
+                <p:oleObj spid="_x0000_s71693" name="Visio" r:id="rId4" imgW="3817620" imgH="5402967" progId="Visio.Drawing.11">
                   <p:embed/>
                 </p:oleObj>
               </mc:Choice>
@@ -15632,7 +15625,21 @@
                 <a:latin typeface="黑体" panose="02010609060101010101" pitchFamily="49" charset="-122"/>
                 <a:ea typeface="黑体" panose="02010609060101010101" pitchFamily="49" charset="-122"/>
               </a:rPr>
-              <a:t>大规模网络过精度时间同步成为多网融合关键问题</a:t>
+              <a:t>大规模</a:t>
+            </a:r>
+            <a:r>
+              <a:rPr lang="zh-CN" altLang="en-US" sz="3200" dirty="0" smtClean="0">
+                <a:latin typeface="黑体" panose="02010609060101010101" pitchFamily="49" charset="-122"/>
+                <a:ea typeface="黑体" panose="02010609060101010101" pitchFamily="49" charset="-122"/>
+              </a:rPr>
+              <a:t>网络高精度</a:t>
+            </a:r>
+            <a:r>
+              <a:rPr lang="zh-CN" altLang="en-US" sz="3200" dirty="0" smtClean="0">
+                <a:latin typeface="黑体" panose="02010609060101010101" pitchFamily="49" charset="-122"/>
+                <a:ea typeface="黑体" panose="02010609060101010101" pitchFamily="49" charset="-122"/>
+              </a:rPr>
+              <a:t>时间同步成为多网融合关键问题</a:t>
             </a:r>
           </a:p>
           <a:p>
@@ -15834,7 +15841,7 @@
         </p:blipFill>
         <p:spPr bwMode="auto">
           <a:xfrm>
-            <a:off x="1905000" y="1905000"/>
+            <a:off x="2057400" y="3878947"/>
             <a:ext cx="5701030" cy="4005263"/>
           </a:xfrm>
           <a:prstGeom prst="rect">

</xml_diff>